<commit_message>
updated slides after devday
</commit_message>
<xml_diff>
--- a/angularjs/slides/a1_aurelia.pptx
+++ b/angularjs/slides/a1_aurelia.pptx
@@ -4426,6 +4426,13 @@
   <p:transition>
     <p:fade/>
   </p:transition>
+  <p:timing>
+    <p:tnLst>
+      <p:par>
+        <p:cTn id="1" dur="indefinite" restart="never" nodeType="tmRoot"/>
+      </p:par>
+    </p:tnLst>
+  </p:timing>
 </p:sld>
 </file>
 
@@ -4579,6 +4586,13 @@
   <p:transition>
     <p:fade/>
   </p:transition>
+  <p:timing>
+    <p:tnLst>
+      <p:par>
+        <p:cTn id="1" dur="indefinite" restart="never" nodeType="tmRoot"/>
+      </p:par>
+    </p:tnLst>
+  </p:timing>
 </p:sld>
 </file>
 
@@ -4907,6 +4921,13 @@
   <p:transition>
     <p:fade/>
   </p:transition>
+  <p:timing>
+    <p:tnLst>
+      <p:par>
+        <p:cTn id="1" dur="indefinite" restart="never" nodeType="tmRoot"/>
+      </p:par>
+    </p:tnLst>
+  </p:timing>
 </p:sld>
 </file>
 
@@ -5084,6 +5105,13 @@
   <p:transition>
     <p:fade/>
   </p:transition>
+  <p:timing>
+    <p:tnLst>
+      <p:par>
+        <p:cTn id="1" dur="indefinite" restart="never" nodeType="tmRoot"/>
+      </p:par>
+    </p:tnLst>
+  </p:timing>
 </p:sld>
 </file>
 
@@ -5365,6 +5393,13 @@
   <p:transition>
     <p:fade/>
   </p:transition>
+  <p:timing>
+    <p:tnLst>
+      <p:par>
+        <p:cTn id="1" dur="indefinite" restart="never" nodeType="tmRoot"/>
+      </p:par>
+    </p:tnLst>
+  </p:timing>
 </p:sld>
 </file>
 
@@ -5474,6 +5509,13 @@
   <p:transition>
     <p:fade/>
   </p:transition>
+  <p:timing>
+    <p:tnLst>
+      <p:par>
+        <p:cTn id="1" dur="indefinite" restart="never" nodeType="tmRoot"/>
+      </p:par>
+    </p:tnLst>
+  </p:timing>
 </p:sld>
 </file>
 
@@ -5587,6 +5629,13 @@
   <p:transition>
     <p:fade/>
   </p:transition>
+  <p:timing>
+    <p:tnLst>
+      <p:par>
+        <p:cTn id="1" dur="indefinite" restart="never" nodeType="tmRoot"/>
+      </p:par>
+    </p:tnLst>
+  </p:timing>
 </p:sld>
 </file>
 

</xml_diff>